<commit_message>
Fixed various typos and stuff in the original PowerPoint files.
</commit_message>
<xml_diff>
--- a/20140206-writing_better_requirements.pptx
+++ b/20140206-writing_better_requirements.pptx
@@ -209,7 +209,7 @@
           <a:p>
             <a:fld id="{740616EA-7DD0-4941-A75A-3667382BAFA7}" type="datetimeFigureOut">
               <a:rPr lang="en-AU" smtClean="0"/>
-              <a:t>3/02/2014</a:t>
+              <a:t>6/06/2016</a:t>
             </a:fld>
             <a:endParaRPr lang="en-AU"/>
           </a:p>
@@ -375,7 +375,7 @@
           <a:p>
             <a:fld id="{587278A0-4A02-4D4B-A8AB-1E1752F8063F}" type="datetimeFigureOut">
               <a:rPr lang="en-AU" smtClean="0"/>
-              <a:t>3/02/2014</a:t>
+              <a:t>6/06/2016</a:t>
             </a:fld>
             <a:endParaRPr lang="en-AU"/>
           </a:p>
@@ -1455,7 +1455,7 @@
           <a:p>
             <a:fld id="{0EAB0777-4C60-462E-A92C-CDAFD498799C}" type="datetimeFigureOut">
               <a:rPr lang="en-US" smtClean="0"/>
-              <a:t>2/3/2014</a:t>
+              <a:t>6/6/2016</a:t>
             </a:fld>
             <a:endParaRPr lang="en-US"/>
           </a:p>
@@ -1624,7 +1624,7 @@
           <a:p>
             <a:fld id="{0EAB0777-4C60-462E-A92C-CDAFD498799C}" type="datetimeFigureOut">
               <a:rPr lang="en-US" smtClean="0"/>
-              <a:t>2/3/2014</a:t>
+              <a:t>6/6/2016</a:t>
             </a:fld>
             <a:endParaRPr lang="en-US"/>
           </a:p>
@@ -1870,7 +1870,7 @@
           <a:p>
             <a:fld id="{0EAB0777-4C60-462E-A92C-CDAFD498799C}" type="datetimeFigureOut">
               <a:rPr lang="en-US" smtClean="0"/>
-              <a:t>2/3/2014</a:t>
+              <a:t>6/6/2016</a:t>
             </a:fld>
             <a:endParaRPr lang="en-US"/>
           </a:p>
@@ -2138,7 +2138,7 @@
           <a:p>
             <a:fld id="{0EAB0777-4C60-462E-A92C-CDAFD498799C}" type="datetimeFigureOut">
               <a:rPr lang="en-US" smtClean="0"/>
-              <a:t>2/3/2014</a:t>
+              <a:t>6/6/2016</a:t>
             </a:fld>
             <a:endParaRPr lang="en-US"/>
           </a:p>
@@ -2520,7 +2520,7 @@
           <a:p>
             <a:fld id="{0EAB0777-4C60-462E-A92C-CDAFD498799C}" type="datetimeFigureOut">
               <a:rPr lang="en-US" smtClean="0"/>
-              <a:t>2/3/2014</a:t>
+              <a:t>6/6/2016</a:t>
             </a:fld>
             <a:endParaRPr lang="en-US"/>
           </a:p>
@@ -2674,7 +2674,7 @@
           <a:p>
             <a:fld id="{0EAB0777-4C60-462E-A92C-CDAFD498799C}" type="datetimeFigureOut">
               <a:rPr lang="en-US" smtClean="0"/>
-              <a:t>2/3/2014</a:t>
+              <a:t>6/6/2016</a:t>
             </a:fld>
             <a:endParaRPr lang="en-US"/>
           </a:p>
@@ -2768,7 +2768,7 @@
           <a:p>
             <a:fld id="{0EAB0777-4C60-462E-A92C-CDAFD498799C}" type="datetimeFigureOut">
               <a:rPr lang="en-US" smtClean="0"/>
-              <a:t>2/3/2014</a:t>
+              <a:t>6/6/2016</a:t>
             </a:fld>
             <a:endParaRPr lang="en-US"/>
           </a:p>
@@ -3033,7 +3033,7 @@
           <a:p>
             <a:fld id="{0EAB0777-4C60-462E-A92C-CDAFD498799C}" type="datetimeFigureOut">
               <a:rPr lang="en-US" smtClean="0"/>
-              <a:t>2/3/2014</a:t>
+              <a:t>6/6/2016</a:t>
             </a:fld>
             <a:endParaRPr lang="en-US"/>
           </a:p>
@@ -3516,7 +3516,7 @@
           <a:p>
             <a:fld id="{0EAB0777-4C60-462E-A92C-CDAFD498799C}" type="datetimeFigureOut">
               <a:rPr lang="en-US" smtClean="0"/>
-              <a:t>2/3/2014</a:t>
+              <a:t>6/6/2016</a:t>
             </a:fld>
             <a:endParaRPr lang="en-US"/>
           </a:p>
@@ -3992,7 +3992,7 @@
           <a:p>
             <a:fld id="{0EAB0777-4C60-462E-A92C-CDAFD498799C}" type="datetimeFigureOut">
               <a:rPr lang="en-US" smtClean="0"/>
-              <a:t>2/3/2014</a:t>
+              <a:t>6/6/2016</a:t>
             </a:fld>
             <a:endParaRPr lang="en-US"/>
           </a:p>
@@ -4171,7 +4171,7 @@
           <a:p>
             <a:fld id="{0EAB0777-4C60-462E-A92C-CDAFD498799C}" type="datetimeFigureOut">
               <a:rPr lang="en-US" smtClean="0"/>
-              <a:t>2/3/2014</a:t>
+              <a:t>6/6/2016</a:t>
             </a:fld>
             <a:endParaRPr lang="en-US"/>
           </a:p>
@@ -6814,7 +6814,7 @@
           <a:p>
             <a:fld id="{0EAB0777-4C60-462E-A92C-CDAFD498799C}" type="datetimeFigureOut">
               <a:rPr lang="en-US" smtClean="0"/>
-              <a:t>2/3/2014</a:t>
+              <a:t>6/6/2016</a:t>
             </a:fld>
             <a:endParaRPr lang="en-US"/>
           </a:p>
@@ -7488,11 +7488,7 @@
           <a:p>
             <a:r>
               <a:rPr lang="en-US" dirty="0" smtClean="0"/>
-              <a:t>6</a:t>
-            </a:r>
-            <a:r>
-              <a:rPr lang="en-US" dirty="0" smtClean="0"/>
-              <a:t>-Feb-2014</a:t>
+              <a:t>6-Feb-2014</a:t>
             </a:r>
             <a:endParaRPr lang="en-AU" dirty="0"/>
           </a:p>
@@ -7627,7 +7623,15 @@
             </a:r>
             <a:r>
               <a:rPr lang="en-AU" dirty="0"/>
-              <a:t>it possible to verify each requirement?</a:t>
+              <a:t>it </a:t>
+            </a:r>
+            <a:r>
+              <a:rPr lang="en-AU" i="1" dirty="0"/>
+              <a:t>possible</a:t>
+            </a:r>
+            <a:r>
+              <a:rPr lang="en-AU" dirty="0"/>
+              <a:t> to verify each requirement?</a:t>
             </a:r>
           </a:p>
           <a:p>
@@ -7638,7 +7642,15 @@
             </a:r>
             <a:r>
               <a:rPr lang="en-AU" dirty="0"/>
-              <a:t>it clear how it should be verified</a:t>
+              <a:t>it clear </a:t>
+            </a:r>
+            <a:r>
+              <a:rPr lang="en-AU" i="1" dirty="0"/>
+              <a:t>how</a:t>
+            </a:r>
+            <a:r>
+              <a:rPr lang="en-AU" dirty="0"/>
+              <a:t> it should be verified</a:t>
             </a:r>
           </a:p>
           <a:p>
@@ -9423,7 +9435,15 @@
             </a:pPr>
             <a:r>
               <a:rPr lang="en-US" sz="2400" dirty="0" smtClean="0"/>
-              <a:t>A limitation of constraint on design or resources</a:t>
+              <a:t>A limitation </a:t>
+            </a:r>
+            <a:r>
+              <a:rPr lang="en-US" sz="2400" dirty="0" smtClean="0"/>
+              <a:t>or </a:t>
+            </a:r>
+            <a:r>
+              <a:rPr lang="en-US" sz="2400" dirty="0" smtClean="0"/>
+              <a:t>constraint on design or resources</a:t>
             </a:r>
           </a:p>
           <a:p>
@@ -9481,12 +9501,12 @@
               <a:t>quality, </a:t>
             </a:r>
             <a:r>
-              <a:rPr lang="en-AU" sz="2400" dirty="0" err="1" smtClean="0"/>
-              <a:t>availabilility</a:t>
+              <a:rPr lang="en-AU" sz="2400" dirty="0" smtClean="0"/>
+              <a:t>availability, </a:t>
             </a:r>
             <a:r>
               <a:rPr lang="en-AU" sz="2400" dirty="0"/>
-              <a:t>, scalability, reliability (the "-</a:t>
+              <a:t>scalability, reliability (the "-</a:t>
             </a:r>
             <a:r>
               <a:rPr lang="en-AU" sz="2400" dirty="0" err="1"/>
@@ -9500,12 +9520,12 @@
           <a:p>
             <a:pPr marL="571500" indent="-514350"/>
             <a:r>
-              <a:rPr lang="en-AU" sz="3000" dirty="0"/>
-              <a:t>G</a:t>
-            </a:r>
-            <a:r>
               <a:rPr lang="en-AU" sz="3000" dirty="0" smtClean="0"/>
-              <a:t>enerally Functional Requirements </a:t>
+              <a:t>Generally, </a:t>
+            </a:r>
+            <a:r>
+              <a:rPr lang="en-AU" sz="3000" dirty="0" smtClean="0"/>
+              <a:t>Functional Requirements </a:t>
             </a:r>
             <a:r>
               <a:rPr lang="en-AU" sz="3000" dirty="0"/>
@@ -9873,7 +9893,7 @@
           <p:nvPr>
             <p:extLst>
               <p:ext uri="{D42A27DB-BD31-4B8C-83A1-F6EECF244321}">
-                <p14:modId xmlns:p14="http://schemas.microsoft.com/office/powerpoint/2010/main" val="1236564272"/>
+                <p14:modId xmlns:p14="http://schemas.microsoft.com/office/powerpoint/2010/main" val="1279383106"/>
               </p:ext>
             </p:extLst>
           </p:nvPr>
@@ -10055,7 +10075,15 @@
                       </a:r>
                       <a:r>
                         <a:rPr lang="en-US" baseline="0" dirty="0" smtClean="0"/>
-                        <a:t> truly optional requirement</a:t>
+                        <a:t> truly </a:t>
+                      </a:r>
+                      <a:r>
+                        <a:rPr lang="en-US" baseline="0" dirty="0" smtClean="0"/>
+                        <a:t>optional, </a:t>
+                      </a:r>
+                      <a:r>
+                        <a:rPr lang="en-US" baseline="0" dirty="0" smtClean="0"/>
+                        <a:t>requirement</a:t>
                       </a:r>
                       <a:endParaRPr lang="en-AU" dirty="0"/>
                     </a:p>
@@ -10252,13 +10280,13 @@
               <a:t>fast", "quickly", "reliable", "normal", "secure", "immediately", </a:t>
             </a:r>
             <a:r>
-              <a:rPr lang="en-AU" dirty="0" err="1"/>
-              <a:t>etc</a:t>
+              <a:rPr lang="en-AU" dirty="0" smtClean="0"/>
+              <a:t>etc.</a:t>
             </a:r>
             <a:endParaRPr lang="en-AU" dirty="0"/>
           </a:p>
           <a:p>
-            <a:pPr lvl="2"/>
+            <a:pPr lvl="3"/>
             <a:r>
               <a:rPr lang="en-AU" i="1" dirty="0" smtClean="0"/>
               <a:t>how </a:t>
@@ -10294,13 +10322,13 @@
               <a:t>such as ...", "including ...", "at least ...", "...or later", </a:t>
             </a:r>
             <a:r>
-              <a:rPr lang="en-AU" dirty="0" err="1"/>
-              <a:t>etc</a:t>
+              <a:rPr lang="en-AU" dirty="0" smtClean="0"/>
+              <a:t>etc.</a:t>
             </a:r>
             <a:endParaRPr lang="en-AU" dirty="0"/>
           </a:p>
           <a:p>
-            <a:pPr lvl="2"/>
+            <a:pPr lvl="3"/>
             <a:r>
               <a:rPr lang="en-AU" i="1" dirty="0" smtClean="0"/>
               <a:t>should </a:t>
@@ -10311,14 +10339,22 @@
             </a:r>
           </a:p>
           <a:p>
-            <a:pPr lvl="2"/>
+            <a:pPr lvl="3"/>
             <a:r>
               <a:rPr lang="en-AU" i="1" dirty="0" smtClean="0"/>
               <a:t>what </a:t>
             </a:r>
             <a:r>
               <a:rPr lang="en-AU" i="1" dirty="0"/>
-              <a:t>happens when the list changes in the future?</a:t>
+              <a:t>happens </a:t>
+            </a:r>
+            <a:r>
+              <a:rPr lang="en-AU" i="1" dirty="0" smtClean="0"/>
+              <a:t>if the </a:t>
+            </a:r>
+            <a:r>
+              <a:rPr lang="en-AU" i="1" dirty="0"/>
+              <a:t>list changes in the future?</a:t>
             </a:r>
           </a:p>
           <a:p>
@@ -10462,7 +10498,7 @@
             <a:endParaRPr lang="en-AU" dirty="0"/>
           </a:p>
           <a:p>
-            <a:pPr lvl="2"/>
+            <a:pPr lvl="3"/>
             <a:r>
               <a:rPr lang="en-AU" dirty="0" smtClean="0"/>
               <a:t>"</a:t>
@@ -10481,7 +10517,7 @@
             </a:r>
           </a:p>
           <a:p>
-            <a:pPr lvl="2"/>
+            <a:pPr lvl="3"/>
             <a:r>
               <a:rPr lang="en-AU" dirty="0" smtClean="0"/>
               <a:t>"</a:t>
@@ -10752,8 +10788,8 @@
               <a:t>“support”, “enable”, “allow”, “provide”, </a:t>
             </a:r>
             <a:r>
-              <a:rPr lang="en-US" sz="2000" dirty="0" err="1" smtClean="0"/>
-              <a:t>etc</a:t>
+              <a:rPr lang="en-US" sz="2000" dirty="0" smtClean="0"/>
+              <a:t>etc.</a:t>
             </a:r>
             <a:endParaRPr lang="en-US" sz="2000" dirty="0" smtClean="0"/>
           </a:p>
@@ -10787,20 +10823,36 @@
             <a:pPr lvl="1"/>
             <a:r>
               <a:rPr lang="en-US" sz="2000" dirty="0" smtClean="0"/>
-              <a:t>“must render anti-aliases text and thin lines”</a:t>
-            </a:r>
-          </a:p>
-          <a:p>
-            <a:pPr lvl="1"/>
-            <a:r>
-              <a:rPr lang="en-US" sz="2000" i="1" dirty="0"/>
+              <a:t>“must render </a:t>
+            </a:r>
+            <a:r>
+              <a:rPr lang="en-US" sz="2000" dirty="0" smtClean="0"/>
+              <a:t>anti-aliased </a:t>
+            </a:r>
+            <a:r>
+              <a:rPr lang="en-US" sz="2000" dirty="0" smtClean="0"/>
+              <a:t>text and thin lines”</a:t>
+            </a:r>
+          </a:p>
+          <a:p>
+            <a:pPr lvl="2"/>
+            <a:r>
+              <a:rPr lang="en-US" sz="1600" i="1" dirty="0"/>
               <a:t>s</a:t>
             </a:r>
             <a:r>
-              <a:rPr lang="en-US" sz="2000" i="1" dirty="0" smtClean="0"/>
-              <a:t>hould the thin lines be anti-aliased?</a:t>
-            </a:r>
-            <a:endParaRPr lang="en-AU" sz="2000" i="1" dirty="0"/>
+              <a:rPr lang="en-US" sz="1600" i="1" dirty="0" smtClean="0"/>
+              <a:t>hould </a:t>
+            </a:r>
+            <a:r>
+              <a:rPr lang="en-US" sz="1600" i="1" dirty="0" smtClean="0"/>
+              <a:t>thin </a:t>
+            </a:r>
+            <a:r>
+              <a:rPr lang="en-US" sz="1600" i="1" dirty="0" smtClean="0"/>
+              <a:t>lines be anti-aliased?</a:t>
+            </a:r>
+            <a:endParaRPr lang="en-AU" sz="1600" i="1" dirty="0"/>
           </a:p>
           <a:p>
             <a:pPr lvl="2"/>

</xml_diff>